<commit_message>
ModelClassDiagram: update the better diagram also
The other diagram was updated with our current terminology. UniqueRoomList and Menu were not included, otherwise it would be too cluttered (and also because I'm lazy).
</commit_message>
<xml_diff>
--- a/docs/diagrams/ModelComponentClassBetterOopDiagram.pptx
+++ b/docs/diagrams/ModelComponentClassBetterOopDiagram.pptx
@@ -208,7 +208,7 @@
           <a:p>
             <a:fld id="{F5CC4B3F-88C1-4FFA-B1B6-F41C21DC6924}" type="datetimeFigureOut">
               <a:rPr lang="en-US" smtClean="0"/>
-              <a:t>6/27/2018</a:t>
+              <a:t>11/11/2018</a:t>
             </a:fld>
             <a:endParaRPr lang="en-US"/>
           </a:p>
@@ -654,7 +654,7 @@
           <a:p>
             <a:fld id="{78C97017-6FC3-485B-9764-EAC9E56C1D49}" type="datetimeFigureOut">
               <a:rPr lang="en-US" smtClean="0"/>
-              <a:t>6/27/2018</a:t>
+              <a:t>11/11/2018</a:t>
             </a:fld>
             <a:endParaRPr lang="en-US"/>
           </a:p>
@@ -822,7 +822,7 @@
           <a:p>
             <a:fld id="{78C97017-6FC3-485B-9764-EAC9E56C1D49}" type="datetimeFigureOut">
               <a:rPr lang="en-US" smtClean="0"/>
-              <a:t>6/27/2018</a:t>
+              <a:t>11/11/2018</a:t>
             </a:fld>
             <a:endParaRPr lang="en-US"/>
           </a:p>
@@ -1000,7 +1000,7 @@
           <a:p>
             <a:fld id="{78C97017-6FC3-485B-9764-EAC9E56C1D49}" type="datetimeFigureOut">
               <a:rPr lang="en-US" smtClean="0"/>
-              <a:t>6/27/2018</a:t>
+              <a:t>11/11/2018</a:t>
             </a:fld>
             <a:endParaRPr lang="en-US"/>
           </a:p>
@@ -1168,7 +1168,7 @@
           <a:p>
             <a:fld id="{78C97017-6FC3-485B-9764-EAC9E56C1D49}" type="datetimeFigureOut">
               <a:rPr lang="en-US" smtClean="0"/>
-              <a:t>6/27/2018</a:t>
+              <a:t>11/11/2018</a:t>
             </a:fld>
             <a:endParaRPr lang="en-US"/>
           </a:p>
@@ -1413,7 +1413,7 @@
           <a:p>
             <a:fld id="{78C97017-6FC3-485B-9764-EAC9E56C1D49}" type="datetimeFigureOut">
               <a:rPr lang="en-US" smtClean="0"/>
-              <a:t>6/27/2018</a:t>
+              <a:t>11/11/2018</a:t>
             </a:fld>
             <a:endParaRPr lang="en-US"/>
           </a:p>
@@ -1698,7 +1698,7 @@
           <a:p>
             <a:fld id="{78C97017-6FC3-485B-9764-EAC9E56C1D49}" type="datetimeFigureOut">
               <a:rPr lang="en-US" smtClean="0"/>
-              <a:t>6/27/2018</a:t>
+              <a:t>11/11/2018</a:t>
             </a:fld>
             <a:endParaRPr lang="en-US"/>
           </a:p>
@@ -2117,7 +2117,7 @@
           <a:p>
             <a:fld id="{78C97017-6FC3-485B-9764-EAC9E56C1D49}" type="datetimeFigureOut">
               <a:rPr lang="en-US" smtClean="0"/>
-              <a:t>6/27/2018</a:t>
+              <a:t>11/11/2018</a:t>
             </a:fld>
             <a:endParaRPr lang="en-US"/>
           </a:p>
@@ -2234,7 +2234,7 @@
           <a:p>
             <a:fld id="{78C97017-6FC3-485B-9764-EAC9E56C1D49}" type="datetimeFigureOut">
               <a:rPr lang="en-US" smtClean="0"/>
-              <a:t>6/27/2018</a:t>
+              <a:t>11/11/2018</a:t>
             </a:fld>
             <a:endParaRPr lang="en-US"/>
           </a:p>
@@ -2329,7 +2329,7 @@
           <a:p>
             <a:fld id="{78C97017-6FC3-485B-9764-EAC9E56C1D49}" type="datetimeFigureOut">
               <a:rPr lang="en-US" smtClean="0"/>
-              <a:t>6/27/2018</a:t>
+              <a:t>11/11/2018</a:t>
             </a:fld>
             <a:endParaRPr lang="en-US"/>
           </a:p>
@@ -2604,7 +2604,7 @@
           <a:p>
             <a:fld id="{78C97017-6FC3-485B-9764-EAC9E56C1D49}" type="datetimeFigureOut">
               <a:rPr lang="en-US" smtClean="0"/>
-              <a:t>6/27/2018</a:t>
+              <a:t>11/11/2018</a:t>
             </a:fld>
             <a:endParaRPr lang="en-US"/>
           </a:p>
@@ -2856,7 +2856,7 @@
           <a:p>
             <a:fld id="{78C97017-6FC3-485B-9764-EAC9E56C1D49}" type="datetimeFigureOut">
               <a:rPr lang="en-US" smtClean="0"/>
-              <a:t>6/27/2018</a:t>
+              <a:t>11/11/2018</a:t>
             </a:fld>
             <a:endParaRPr lang="en-US"/>
           </a:p>
@@ -3067,7 +3067,7 @@
           <a:p>
             <a:fld id="{78C97017-6FC3-485B-9764-EAC9E56C1D49}" type="datetimeFigureOut">
               <a:rPr lang="en-US" smtClean="0"/>
-              <a:t>6/27/2018</a:t>
+              <a:t>11/11/2018</a:t>
             </a:fld>
             <a:endParaRPr lang="en-US"/>
           </a:p>
@@ -3992,12 +3992,12 @@
           <a:p>
             <a:pPr algn="ctr"/>
             <a:r>
-              <a:rPr lang="en-US" sz="1050" dirty="0" err="1" smtClean="0">
+              <a:rPr lang="en-US" sz="1050" dirty="0" err="1">
                 <a:solidFill>
                   <a:srgbClr val="7030A0"/>
                 </a:solidFill>
               </a:rPr>
-              <a:t>VersionedAddressBook</a:t>
+              <a:t>VersionedConcierge</a:t>
             </a:r>
             <a:endParaRPr lang="en-SG" sz="1050" dirty="0">
               <a:solidFill>
@@ -4139,7 +4139,7 @@
                   <a:srgbClr val="7030A0"/>
                 </a:solidFill>
               </a:rPr>
-              <a:t>UniquePersonList</a:t>
+              <a:t>UniqueGuestList</a:t>
             </a:r>
             <a:endParaRPr lang="en-SG" sz="1050" dirty="0">
               <a:solidFill>
@@ -4283,7 +4283,7 @@
                   <a:srgbClr val="7030A0"/>
                 </a:solidFill>
               </a:rPr>
-              <a:t>Person</a:t>
+              <a:t>Guest</a:t>
             </a:r>
             <a:endParaRPr lang="en-SG" sz="1050" dirty="0">
               <a:solidFill>
@@ -4719,14 +4719,53 @@
       </p:cxnSp>
       <p:sp>
         <p:nvSpPr>
-          <p:cNvPr id="85" name="Rectangle 8"/>
+          <p:cNvPr id="114" name="TextBox 113"/>
+          <p:cNvSpPr txBox="1"/>
+          <p:nvPr/>
+        </p:nvSpPr>
+        <p:spPr>
+          <a:xfrm rot="16200000">
+            <a:off x="6362886" y="3586305"/>
+            <a:ext cx="881018" cy="261610"/>
+          </a:xfrm>
+          <a:prstGeom prst="rect">
+            <a:avLst/>
+          </a:prstGeom>
+          <a:noFill/>
+        </p:spPr>
+        <p:txBody>
+          <a:bodyPr wrap="square" rtlCol="0">
+            <a:spAutoFit/>
+          </a:bodyPr>
+          <a:lstStyle/>
+          <a:p>
+            <a:pPr algn="r"/>
+            <a:r>
+              <a:rPr lang="en-US" sz="1100" dirty="0">
+                <a:solidFill>
+                  <a:srgbClr val="7030A0"/>
+                </a:solidFill>
+              </a:rPr>
+              <a:t>filtered list</a:t>
+            </a:r>
+            <a:endParaRPr lang="en-SG" sz="1100" dirty="0">
+              <a:solidFill>
+                <a:srgbClr val="7030A0"/>
+              </a:solidFill>
+            </a:endParaRPr>
+          </a:p>
+        </p:txBody>
+      </p:sp>
+      <p:sp>
+        <p:nvSpPr>
+          <p:cNvPr id="122" name="Rectangle 8"/>
           <p:cNvSpPr/>
           <p:nvPr/>
         </p:nvSpPr>
         <p:spPr>
           <a:xfrm>
-            <a:off x="7712397" y="3533171"/>
-            <a:ext cx="708186" cy="285783"/>
+            <a:off x="2057401" y="4239491"/>
+            <a:ext cx="1066800" cy="346760"/>
           </a:xfrm>
           <a:prstGeom prst="rect">
             <a:avLst/>
@@ -4763,151 +4802,7 @@
                   <a:srgbClr val="7030A0"/>
                 </a:solidFill>
               </a:rPr>
-              <a:t>Address</a:t>
-            </a:r>
-            <a:endParaRPr lang="en-SG" sz="1050" dirty="0">
-              <a:solidFill>
-                <a:srgbClr val="7030A0"/>
-              </a:solidFill>
-            </a:endParaRPr>
-          </a:p>
-        </p:txBody>
-      </p:sp>
-      <p:cxnSp>
-        <p:nvCxnSpPr>
-          <p:cNvPr id="86" name="Elbow Connector 85"/>
-          <p:cNvCxnSpPr>
-            <a:stCxn id="78" idx="3"/>
-            <a:endCxn id="85" idx="1"/>
-          </p:cNvCxnSpPr>
-          <p:nvPr/>
-        </p:nvCxnSpPr>
-        <p:spPr>
-          <a:xfrm>
-            <a:off x="7277995" y="3034891"/>
-            <a:ext cx="434402" cy="641172"/>
-          </a:xfrm>
-          <a:prstGeom prst="bentConnector3">
-            <a:avLst/>
-          </a:prstGeom>
-          <a:ln w="19050">
-            <a:solidFill>
-              <a:srgbClr val="7030A0"/>
-            </a:solidFill>
-            <a:headEnd type="none" w="med" len="med"/>
-            <a:tailEnd type="arrow" w="med" len="med"/>
-          </a:ln>
-          <a:effectLst/>
-        </p:spPr>
-        <p:style>
-          <a:lnRef idx="1">
-            <a:schemeClr val="accent2"/>
-          </a:lnRef>
-          <a:fillRef idx="2">
-            <a:schemeClr val="accent2"/>
-          </a:fillRef>
-          <a:effectRef idx="1">
-            <a:schemeClr val="accent2"/>
-          </a:effectRef>
-          <a:fontRef idx="minor">
-            <a:schemeClr val="dk1"/>
-          </a:fontRef>
-        </p:style>
-      </p:cxnSp>
-      <p:sp>
-        <p:nvSpPr>
-          <p:cNvPr id="114" name="TextBox 113"/>
-          <p:cNvSpPr txBox="1"/>
-          <p:nvPr/>
-        </p:nvSpPr>
-        <p:spPr>
-          <a:xfrm rot="16200000">
-            <a:off x="6362886" y="3586305"/>
-            <a:ext cx="881018" cy="261610"/>
-          </a:xfrm>
-          <a:prstGeom prst="rect">
-            <a:avLst/>
-          </a:prstGeom>
-          <a:noFill/>
-        </p:spPr>
-        <p:txBody>
-          <a:bodyPr wrap="square" rtlCol="0">
-            <a:spAutoFit/>
-          </a:bodyPr>
-          <a:lstStyle/>
-          <a:p>
-            <a:pPr algn="r"/>
-            <a:r>
-              <a:rPr lang="en-US" sz="1100" dirty="0">
-                <a:solidFill>
-                  <a:srgbClr val="7030A0"/>
-                </a:solidFill>
-              </a:rPr>
-              <a:t>filtered list</a:t>
-            </a:r>
-            <a:endParaRPr lang="en-SG" sz="1100" dirty="0">
-              <a:solidFill>
-                <a:srgbClr val="7030A0"/>
-              </a:solidFill>
-            </a:endParaRPr>
-          </a:p>
-        </p:txBody>
-      </p:sp>
-      <p:sp>
-        <p:nvSpPr>
-          <p:cNvPr id="122" name="Rectangle 8"/>
-          <p:cNvSpPr/>
-          <p:nvPr/>
-        </p:nvSpPr>
-        <p:spPr>
-          <a:xfrm>
-            <a:off x="2057401" y="4239491"/>
-            <a:ext cx="1066800" cy="346760"/>
-          </a:xfrm>
-          <a:prstGeom prst="rect">
-            <a:avLst/>
-          </a:prstGeom>
-          <a:ln w="19050">
-            <a:solidFill>
-              <a:srgbClr val="7030A0"/>
-            </a:solidFill>
-          </a:ln>
-          <a:effectLst/>
-        </p:spPr>
-        <p:style>
-          <a:lnRef idx="1">
-            <a:schemeClr val="accent4"/>
-          </a:lnRef>
-          <a:fillRef idx="2">
-            <a:schemeClr val="accent4"/>
-          </a:fillRef>
-          <a:effectRef idx="1">
-            <a:schemeClr val="accent4"/>
-          </a:effectRef>
-          <a:fontRef idx="minor">
-            <a:schemeClr val="dk1"/>
-          </a:fontRef>
-        </p:style>
-        <p:txBody>
-          <a:bodyPr rtlCol="0" anchor="ctr"/>
-          <a:lstStyle/>
-          <a:p>
-            <a:pPr algn="ctr"/>
-            <a:r>
-              <a:rPr lang="en-US" sz="1050" dirty="0">
-                <a:solidFill>
-                  <a:srgbClr val="7030A0"/>
-                </a:solidFill>
-              </a:rPr>
               <a:t>&lt;&lt;interface&gt;&gt;</a:t>
-            </a:r>
-            <a:r>
-              <a:rPr lang="en-US" sz="1050">
-                <a:solidFill>
-                  <a:srgbClr val="7030A0"/>
-                </a:solidFill>
-              </a:rPr>
-              <a:t/>
             </a:r>
             <a:br>
               <a:rPr lang="en-US" sz="1050">
@@ -5829,7 +5724,7 @@
                   <a:srgbClr val="7030A0"/>
                 </a:solidFill>
               </a:rPr>
-              <a:t>ReadOnlyAddressBook</a:t>
+              <a:t>ReadOnlyConcierge</a:t>
             </a:r>
             <a:endParaRPr lang="en-SG" sz="1050" dirty="0">
               <a:solidFill>
@@ -5880,12 +5775,12 @@
           <a:p>
             <a:pPr algn="ctr"/>
             <a:r>
-              <a:rPr lang="en-US" sz="1050" dirty="0" err="1">
+              <a:rPr lang="en-US" sz="1050" dirty="0">
                 <a:solidFill>
                   <a:srgbClr val="7030A0"/>
                 </a:solidFill>
               </a:rPr>
-              <a:t>AddressBook</a:t>
+              <a:t>Concierge</a:t>
             </a:r>
             <a:endParaRPr lang="en-SG" sz="1050" dirty="0">
               <a:solidFill>

</xml_diff>